<commit_message>
removed squiggly line from toTaxon
</commit_message>
<xml_diff>
--- a/img/dsw-1.0-graph-model.pptx
+++ b/img/dsw-1.0-graph-model.pptx
@@ -3150,19 +3150,7 @@
           <a:p>
             <a:r>
               <a:rPr lang="en-US" sz="2800" dirty="0" smtClean="0"/>
-              <a:t>Darwin-SW version </a:t>
-            </a:r>
-            <a:r>
-              <a:rPr lang="en-US" sz="2800" dirty="0" smtClean="0"/>
-              <a:t>1.0</a:t>
-            </a:r>
-            <a:r>
-              <a:rPr lang="en-US" sz="2800" dirty="0" smtClean="0"/>
-              <a:t> </a:t>
-            </a:r>
-            <a:r>
-              <a:rPr lang="en-US" sz="2800" dirty="0" smtClean="0"/>
-              <a:t>from </a:t>
+              <a:t>Darwin-SW version 1.0 from </a:t>
             </a:r>
             <a:r>
               <a:rPr lang="en-US" sz="2800" dirty="0"/>
@@ -3170,13 +3158,8 @@
             </a:r>
             <a:r>
               <a:rPr lang="en-US" sz="2800" dirty="0" smtClean="0"/>
-              <a:t>github.com/darwin-sw/dsw/releases/tag/1.0/</a:t>
-            </a:r>
-            <a:r>
-              <a:rPr lang="en-US" sz="2800" dirty="0" smtClean="0"/>
-              <a:t>dsw.owl  </a:t>
-            </a:r>
-            <a:endParaRPr lang="en-US" sz="2800" dirty="0" smtClean="0"/>
+              <a:t>github.com/darwin-sw/dsw/releases/tag/1.0/dsw.owl  </a:t>
+            </a:r>
           </a:p>
           <a:p>
             <a:r>
@@ -4284,18 +4267,13 @@
           <a:lstStyle/>
           <a:p>
             <a:r>
-              <a:rPr lang="en-US" sz="3600" b="1" i="1" dirty="0" err="1" smtClean="0">
+              <a:rPr lang="en-US" sz="3600" b="1" i="1" dirty="0" smtClean="0">
                 <a:solidFill>
                   <a:srgbClr val="FF0000"/>
                 </a:solidFill>
               </a:rPr>
               <a:t>dwciri:toTaxon</a:t>
             </a:r>
-            <a:endParaRPr lang="en-US" sz="3600" b="1" i="1" dirty="0" smtClean="0">
-              <a:solidFill>
-                <a:srgbClr val="FF0000"/>
-              </a:solidFill>
-            </a:endParaRPr>
           </a:p>
         </p:txBody>
       </p:sp>
@@ -5232,14 +5210,7 @@
                 <a:latin typeface="Courier New" panose="02070309020205020404" pitchFamily="49" charset="0"/>
                 <a:cs typeface="Courier New" panose="02070309020205020404" pitchFamily="49" charset="0"/>
               </a:rPr>
-              <a:t>                 yellow=FOAF </a:t>
-            </a:r>
-            <a:r>
-              <a:rPr lang="en-US" sz="3200" dirty="0" smtClean="0">
-                <a:latin typeface="Courier New" panose="02070309020205020404" pitchFamily="49" charset="0"/>
-                <a:cs typeface="Courier New" panose="02070309020205020404" pitchFamily="49" charset="0"/>
-              </a:rPr>
-              <a:t>vocabulary</a:t>
+              <a:t>                 yellow=FOAF vocabulary</a:t>
             </a:r>
           </a:p>
           <a:p>
@@ -5262,10 +5233,6 @@
               </a:rPr>
               <a:t>Gray represents the non-preferred predicate of an inverse pair.</a:t>
             </a:r>
-            <a:endParaRPr lang="en-US" sz="3200" dirty="0" smtClean="0">
-              <a:latin typeface="Courier New" panose="02070309020205020404" pitchFamily="49" charset="0"/>
-              <a:cs typeface="Courier New" panose="02070309020205020404" pitchFamily="49" charset="0"/>
-            </a:endParaRPr>
           </a:p>
         </p:txBody>
       </p:sp>
@@ -5995,24 +5962,15 @@
             <a:pPr algn="ctr"/>
             <a:r>
               <a:rPr lang="en-US" sz="4400" b="1" dirty="0" smtClean="0"/>
-              <a:t>2016 </a:t>
-            </a:r>
+              <a:t>2016 Darwin-SW (DSW) ontology</a:t>
+            </a:r>
+          </a:p>
+          <a:p>
+            <a:pPr algn="ctr"/>
             <a:r>
               <a:rPr lang="en-US" sz="4400" b="1" dirty="0" smtClean="0"/>
-              <a:t>Darwin-SW (DSW) ontology</a:t>
-            </a:r>
-          </a:p>
-          <a:p>
-            <a:pPr algn="ctr"/>
-            <a:r>
-              <a:rPr lang="en-US" sz="4400" b="1" dirty="0" smtClean="0"/>
-              <a:t>(version </a:t>
-            </a:r>
-            <a:r>
-              <a:rPr lang="en-US" sz="4400" b="1" dirty="0" smtClean="0"/>
-              <a:t>1.0) </a:t>
-            </a:r>
-            <a:endParaRPr lang="en-US" sz="4400" b="1" dirty="0" smtClean="0"/>
+              <a:t>(version 1.0) </a:t>
+            </a:r>
           </a:p>
         </p:txBody>
       </p:sp>

</xml_diff>